<commit_message>
docs: add technical deep dive to presentation
</commit_message>
<xml_diff>
--- a/EtherX_Sentinel.pptx
+++ b/EtherX_Sentinel.pptx
@@ -14,6 +14,7 @@
     <p:sldId id="262" r:id="rId13"/>
     <p:sldId id="263" r:id="rId14"/>
     <p:sldId id="264" r:id="rId15"/>
+    <p:sldId id="265" r:id="rId16"/>
   </p:sldIdLst>
   <p:sldSz cx="9144000" cy="6858000" type="screen4x3"/>
   <p:notesSz cx="6858000" cy="9144000"/>
@@ -3151,6 +3152,62 @@
 </p:sld>
 </file>
 
+<file path=ppt/slides/slide10.xml><?xml version="1.0" encoding="utf-8"?>
+<p:sld xmlns:a="http://schemas.openxmlformats.org/drawingml/2006/main" xmlns:p="http://schemas.openxmlformats.org/presentationml/2006/main" xmlns:r="http://schemas.openxmlformats.org/officeDocument/2006/relationships">
+  <p:cSld>
+    <p:spTree>
+      <p:nvGrpSpPr>
+        <p:cNvPr id="1" name=""/>
+        <p:cNvGrpSpPr/>
+        <p:nvPr/>
+      </p:nvGrpSpPr>
+      <p:grpSpPr/>
+      <p:sp>
+        <p:nvSpPr>
+          <p:cNvPr id="2" name="Title 1"/>
+          <p:cNvSpPr>
+            <a:spLocks noGrp="1"/>
+          </p:cNvSpPr>
+          <p:nvPr>
+            <p:ph type="ctrTitle"/>
+          </p:nvPr>
+        </p:nvSpPr>
+        <p:spPr/>
+        <p:txBody>
+          <a:bodyPr/>
+          <a:lstStyle/>
+          <a:p>
+            <a:r>
+              <a:t>Q&amp;A</a:t>
+            </a:r>
+          </a:p>
+        </p:txBody>
+      </p:sp>
+      <p:sp>
+        <p:nvSpPr>
+          <p:cNvPr id="3" name="Subtitle 2"/>
+          <p:cNvSpPr>
+            <a:spLocks noGrp="1"/>
+          </p:cNvSpPr>
+          <p:nvPr>
+            <p:ph type="subTitle" idx="1"/>
+          </p:nvPr>
+        </p:nvSpPr>
+        <p:spPr/>
+        <p:txBody>
+          <a:bodyPr/>
+          <a:lstStyle/>
+          <a:p/>
+        </p:txBody>
+      </p:sp>
+    </p:spTree>
+  </p:cSld>
+  <p:clrMapOvr>
+    <a:masterClrMapping/>
+  </p:clrMapOvr>
+</p:sld>
+</file>
+
 <file path=ppt/slides/slide2.xml><?xml version="1.0" encoding="utf-8"?>
 <p:sld xmlns:a="http://schemas.openxmlformats.org/drawingml/2006/main" xmlns:p="http://schemas.openxmlformats.org/presentationml/2006/main" xmlns:r="http://schemas.openxmlformats.org/officeDocument/2006/relationships">
   <p:cSld>
@@ -3417,7 +3474,7 @@
           <a:lstStyle/>
           <a:p>
             <a:r>
-              <a:t>Key Innovations</a:t>
+              <a:t>Technical Deep Dive: Under the Hood</a:t>
             </a:r>
           </a:p>
         </p:txBody>
@@ -3438,25 +3495,37 @@
           <a:lstStyle/>
           <a:p>
             <a:r>
-              <a:t>Holographic Dashboard: Real-time, WebSocket-powered Neural Grid UI.</a:t>
+              <a:t>1. The AI Model: PyTorch Autoencoder (Compression Network).</a:t>
             </a:r>
           </a:p>
           <a:p>
             <a:pPr/>
             <a:r>
-              <a:t>Live Threat Intel: Active monitoring of SQLi, XSS, and Anomalies.</a:t>
+              <a:t>2. Embedding: 'all-MiniLM-L6-v2' (384-d Vector Space).</a:t>
             </a:r>
           </a:p>
           <a:p>
             <a:pPr/>
             <a:r>
-              <a:t>Persistent Memory: SQLite-backed behavioral logging.</a:t>
+              <a:t>3. Training Data: 'benign_traffic.txt' (Learns Normality).</a:t>
             </a:r>
           </a:p>
           <a:p>
             <a:pPr/>
             <a:r>
-              <a:t>Cyberpunk Aesthetics: Designed for the modern SOC.</a:t>
+              <a:t>4. Risk Analysis (JSON Brain):</a:t>
+            </a:r>
+          </a:p>
+          <a:p>
+            <a:pPr/>
+            <a:r>
+              <a:t>   - reconstruction_error: &gt;0.02 = Anomaly (Zero-Day).</a:t>
+            </a:r>
+          </a:p>
+          <a:p>
+            <a:pPr/>
+            <a:r>
+              <a:t>   - neural_anomaly: Boolean flag for high-confidence blocks.</a:t>
             </a:r>
           </a:p>
         </p:txBody>
@@ -3495,7 +3564,7 @@
           <a:lstStyle/>
           <a:p>
             <a:r>
-              <a:t>Architecture</a:t>
+              <a:t>Key Innovations</a:t>
             </a:r>
           </a:p>
         </p:txBody>
@@ -3516,25 +3585,25 @@
           <a:lstStyle/>
           <a:p>
             <a:r>
-              <a:t>Client Traffic -&gt; Ingestion Layer (FastAPI)</a:t>
+              <a:t>Holographic Dashboard: Real-time, WebSocket-powered Neural Grid UI.</a:t>
             </a:r>
           </a:p>
           <a:p>
             <a:pPr/>
             <a:r>
-              <a:t>-&gt; AI Model (SentenceTransformer + Autoencoder)</a:t>
+              <a:t>Live Threat Intel: Active monitoring of SQLi, XSS, and Anomalies.</a:t>
             </a:r>
           </a:p>
           <a:p>
             <a:pPr/>
             <a:r>
-              <a:t>-&gt; Decision (Allow/Block)</a:t>
+              <a:t>Persistent Memory: SQLite-backed behavioral logging.</a:t>
             </a:r>
           </a:p>
           <a:p>
             <a:pPr/>
             <a:r>
-              <a:t>-&gt; Dashboard (WebSocket Stream)</a:t>
+              <a:t>Cyberpunk Aesthetics: Designed for the modern SOC.</a:t>
             </a:r>
           </a:p>
         </p:txBody>
@@ -3573,7 +3642,7 @@
           <a:lstStyle/>
           <a:p>
             <a:r>
-              <a:t>Live Demo Plan</a:t>
+              <a:t>Architecture</a:t>
             </a:r>
           </a:p>
         </p:txBody>
@@ -3594,31 +3663,25 @@
           <a:lstStyle/>
           <a:p>
             <a:r>
-              <a:t>1. Normal Traffic: Browsing the site (Allowed).</a:t>
+              <a:t>Client Traffic -&gt; Ingestion Layer (FastAPI)</a:t>
             </a:r>
           </a:p>
           <a:p>
             <a:pPr/>
             <a:r>
-              <a:t>2. SQL Injection: Attempting 'OR 1=1' (Blocked by AI).</a:t>
+              <a:t>-&gt; AI Model (SentenceTransformer + Autoencoder)</a:t>
             </a:r>
           </a:p>
           <a:p>
             <a:pPr/>
             <a:r>
-              <a:t>3. XSS Attack: Trying '&lt;script&gt;' tags (Blocked).</a:t>
+              <a:t>-&gt; Decision (Allow/Block)</a:t>
             </a:r>
           </a:p>
           <a:p>
             <a:pPr/>
             <a:r>
-              <a:t>4. Obfuscation: Complex encodings (Blocked by Semantic Analysis).</a:t>
-            </a:r>
-          </a:p>
-          <a:p>
-            <a:pPr/>
-            <a:r>
-              <a:t>5. Dashboard: Real-time visualization of these events.</a:t>
+              <a:t>-&gt; Dashboard (WebSocket Stream)</a:t>
             </a:r>
           </a:p>
         </p:txBody>
@@ -3657,7 +3720,7 @@
           <a:lstStyle/>
           <a:p>
             <a:r>
-              <a:t>Conclusion</a:t>
+              <a:t>Live Demo Plan</a:t>
             </a:r>
           </a:p>
         </p:txBody>
@@ -3678,19 +3741,31 @@
           <a:lstStyle/>
           <a:p>
             <a:r>
-              <a:t>EtherX Sentinel represents the future of adaptive application security.</a:t>
+              <a:t>1. Normal Traffic: Browsing the site (Allowed).</a:t>
             </a:r>
           </a:p>
           <a:p>
             <a:pPr/>
             <a:r>
-              <a:t>It learns, evolves, and protects without manual intervention.</a:t>
+              <a:t>2. SQL Injection: Attempting 'OR 1=1' (Blocked by AI).</a:t>
             </a:r>
           </a:p>
           <a:p>
             <a:pPr/>
             <a:r>
-              <a:t>Team KADAVUL is proud to present this next-gen solution.</a:t>
+              <a:t>3. XSS Attack: Trying '&lt;script&gt;' tags (Blocked).</a:t>
+            </a:r>
+          </a:p>
+          <a:p>
+            <a:pPr/>
+            <a:r>
+              <a:t>4. Obfuscation: Complex encodings (Blocked by Semantic Analysis).</a:t>
+            </a:r>
+          </a:p>
+          <a:p>
+            <a:pPr/>
+            <a:r>
+              <a:t>5. Dashboard: Real-time visualization of these events.</a:t>
             </a:r>
           </a:p>
         </p:txBody>
@@ -3720,35 +3795,51 @@
             <a:spLocks noGrp="1"/>
           </p:cNvSpPr>
           <p:nvPr>
-            <p:ph type="ctrTitle"/>
-          </p:nvPr>
-        </p:nvSpPr>
-        <p:spPr/>
-        <p:txBody>
-          <a:bodyPr/>
-          <a:lstStyle/>
-          <a:p>
-            <a:r>
-              <a:t>Q&amp;A</a:t>
-            </a:r>
-          </a:p>
-        </p:txBody>
-      </p:sp>
-      <p:sp>
-        <p:nvSpPr>
-          <p:cNvPr id="3" name="Subtitle 2"/>
-          <p:cNvSpPr>
-            <a:spLocks noGrp="1"/>
-          </p:cNvSpPr>
-          <p:nvPr>
-            <p:ph type="subTitle" idx="1"/>
-          </p:nvPr>
-        </p:nvSpPr>
-        <p:spPr/>
-        <p:txBody>
-          <a:bodyPr/>
-          <a:lstStyle/>
-          <a:p/>
+            <p:ph type="title"/>
+          </p:nvPr>
+        </p:nvSpPr>
+        <p:spPr/>
+        <p:txBody>
+          <a:bodyPr/>
+          <a:lstStyle/>
+          <a:p>
+            <a:r>
+              <a:t>Conclusion</a:t>
+            </a:r>
+          </a:p>
+        </p:txBody>
+      </p:sp>
+      <p:sp>
+        <p:nvSpPr>
+          <p:cNvPr id="3" name="Content Placeholder 2"/>
+          <p:cNvSpPr>
+            <a:spLocks noGrp="1"/>
+          </p:cNvSpPr>
+          <p:nvPr>
+            <p:ph idx="1"/>
+          </p:nvPr>
+        </p:nvSpPr>
+        <p:spPr/>
+        <p:txBody>
+          <a:bodyPr/>
+          <a:lstStyle/>
+          <a:p>
+            <a:r>
+              <a:t>EtherX Sentinel represents the future of adaptive application security.</a:t>
+            </a:r>
+          </a:p>
+          <a:p>
+            <a:pPr/>
+            <a:r>
+              <a:t>It learns, evolves, and protects without manual intervention.</a:t>
+            </a:r>
+          </a:p>
+          <a:p>
+            <a:pPr/>
+            <a:r>
+              <a:t>Team KADAVUL is proud to present this next-gen solution.</a:t>
+            </a:r>
+          </a:p>
         </p:txBody>
       </p:sp>
     </p:spTree>

</xml_diff>

<commit_message>
docs: add training pipeline to presentation
</commit_message>
<xml_diff>
--- a/EtherX_Sentinel.pptx
+++ b/EtherX_Sentinel.pptx
@@ -15,6 +15,7 @@
     <p:sldId id="263" r:id="rId14"/>
     <p:sldId id="264" r:id="rId15"/>
     <p:sldId id="265" r:id="rId16"/>
+    <p:sldId id="266" r:id="rId17"/>
   </p:sldIdLst>
   <p:sldSz cx="9144000" cy="6858000" type="screen4x3"/>
   <p:notesSz cx="6858000" cy="9144000"/>
@@ -3169,6 +3170,78 @@
             <a:spLocks noGrp="1"/>
           </p:cNvSpPr>
           <p:nvPr>
+            <p:ph type="title"/>
+          </p:nvPr>
+        </p:nvSpPr>
+        <p:spPr/>
+        <p:txBody>
+          <a:bodyPr/>
+          <a:lstStyle/>
+          <a:p>
+            <a:r>
+              <a:t>Conclusion</a:t>
+            </a:r>
+          </a:p>
+        </p:txBody>
+      </p:sp>
+      <p:sp>
+        <p:nvSpPr>
+          <p:cNvPr id="3" name="Content Placeholder 2"/>
+          <p:cNvSpPr>
+            <a:spLocks noGrp="1"/>
+          </p:cNvSpPr>
+          <p:nvPr>
+            <p:ph idx="1"/>
+          </p:nvPr>
+        </p:nvSpPr>
+        <p:spPr/>
+        <p:txBody>
+          <a:bodyPr/>
+          <a:lstStyle/>
+          <a:p>
+            <a:r>
+              <a:t>EtherX Sentinel represents the future of adaptive application security.</a:t>
+            </a:r>
+          </a:p>
+          <a:p>
+            <a:pPr/>
+            <a:r>
+              <a:t>It learns, evolves, and protects without manual intervention.</a:t>
+            </a:r>
+          </a:p>
+          <a:p>
+            <a:pPr/>
+            <a:r>
+              <a:t>Team KADAVUL is proud to present this next-gen solution.</a:t>
+            </a:r>
+          </a:p>
+        </p:txBody>
+      </p:sp>
+    </p:spTree>
+  </p:cSld>
+  <p:clrMapOvr>
+    <a:masterClrMapping/>
+  </p:clrMapOvr>
+</p:sld>
+</file>
+
+<file path=ppt/slides/slide11.xml><?xml version="1.0" encoding="utf-8"?>
+<p:sld xmlns:a="http://schemas.openxmlformats.org/drawingml/2006/main" xmlns:p="http://schemas.openxmlformats.org/presentationml/2006/main" xmlns:r="http://schemas.openxmlformats.org/officeDocument/2006/relationships">
+  <p:cSld>
+    <p:spTree>
+      <p:nvGrpSpPr>
+        <p:cNvPr id="1" name=""/>
+        <p:cNvGrpSpPr/>
+        <p:nvPr/>
+      </p:nvGrpSpPr>
+      <p:grpSpPr/>
+      <p:sp>
+        <p:nvSpPr>
+          <p:cNvPr id="2" name="Title 1"/>
+          <p:cNvSpPr>
+            <a:spLocks noGrp="1"/>
+          </p:cNvSpPr>
+          <p:nvPr>
             <p:ph type="ctrTitle"/>
           </p:nvPr>
         </p:nvSpPr>
@@ -3564,7 +3637,7 @@
           <a:lstStyle/>
           <a:p>
             <a:r>
-              <a:t>Key Innovations</a:t>
+              <a:t>The Training Pipeline</a:t>
             </a:r>
           </a:p>
         </p:txBody>
@@ -3585,25 +3658,37 @@
           <a:lstStyle/>
           <a:p>
             <a:r>
-              <a:t>Holographic Dashboard: Real-time, WebSocket-powered Neural Grid UI.</a:t>
+              <a:t>1. Data Gen: 'generate_traffic.py' creates synthetic 'valid' traffic.</a:t>
             </a:r>
           </a:p>
           <a:p>
             <a:pPr/>
             <a:r>
-              <a:t>Live Threat Intel: Active monitoring of SQLi, XSS, and Anomalies.</a:t>
+              <a:t>2. Vectorization: Traffic -&gt; Embeddings (Lists of numbers).</a:t>
             </a:r>
           </a:p>
           <a:p>
             <a:pPr/>
             <a:r>
-              <a:t>Persistent Memory: SQLite-backed behavioral logging.</a:t>
+              <a:t>3. Self-Supervised Learning: Model forces itself to learn patterns.</a:t>
             </a:r>
           </a:p>
           <a:p>
             <a:pPr/>
             <a:r>
-              <a:t>Cyberpunk Aesthetics: Designed for the modern SOC.</a:t>
+              <a:t>   - Loss Function: Mean Squared Error (MSE).</a:t>
+            </a:r>
+          </a:p>
+          <a:p>
+            <a:pPr/>
+            <a:r>
+              <a:t>   - Goal: Output ≈ Input.</a:t>
+            </a:r>
+          </a:p>
+          <a:p>
+            <a:pPr/>
+            <a:r>
+              <a:t>4. Result: Model becomes an expert at 'Normality'.</a:t>
             </a:r>
           </a:p>
         </p:txBody>
@@ -3642,7 +3727,7 @@
           <a:lstStyle/>
           <a:p>
             <a:r>
-              <a:t>Architecture</a:t>
+              <a:t>Key Innovations</a:t>
             </a:r>
           </a:p>
         </p:txBody>
@@ -3663,25 +3748,25 @@
           <a:lstStyle/>
           <a:p>
             <a:r>
-              <a:t>Client Traffic -&gt; Ingestion Layer (FastAPI)</a:t>
+              <a:t>Holographic Dashboard: Real-time, WebSocket-powered Neural Grid UI.</a:t>
             </a:r>
           </a:p>
           <a:p>
             <a:pPr/>
             <a:r>
-              <a:t>-&gt; AI Model (SentenceTransformer + Autoencoder)</a:t>
+              <a:t>Live Threat Intel: Active monitoring of SQLi, XSS, and Anomalies.</a:t>
             </a:r>
           </a:p>
           <a:p>
             <a:pPr/>
             <a:r>
-              <a:t>-&gt; Decision (Allow/Block)</a:t>
+              <a:t>Persistent Memory: SQLite-backed behavioral logging.</a:t>
             </a:r>
           </a:p>
           <a:p>
             <a:pPr/>
             <a:r>
-              <a:t>-&gt; Dashboard (WebSocket Stream)</a:t>
+              <a:t>Cyberpunk Aesthetics: Designed for the modern SOC.</a:t>
             </a:r>
           </a:p>
         </p:txBody>
@@ -3720,7 +3805,7 @@
           <a:lstStyle/>
           <a:p>
             <a:r>
-              <a:t>Live Demo Plan</a:t>
+              <a:t>Architecture</a:t>
             </a:r>
           </a:p>
         </p:txBody>
@@ -3741,31 +3826,25 @@
           <a:lstStyle/>
           <a:p>
             <a:r>
-              <a:t>1. Normal Traffic: Browsing the site (Allowed).</a:t>
+              <a:t>Client Traffic -&gt; Ingestion Layer (FastAPI)</a:t>
             </a:r>
           </a:p>
           <a:p>
             <a:pPr/>
             <a:r>
-              <a:t>2. SQL Injection: Attempting 'OR 1=1' (Blocked by AI).</a:t>
+              <a:t>-&gt; AI Model (SentenceTransformer + Autoencoder)</a:t>
             </a:r>
           </a:p>
           <a:p>
             <a:pPr/>
             <a:r>
-              <a:t>3. XSS Attack: Trying '&lt;script&gt;' tags (Blocked).</a:t>
+              <a:t>-&gt; Decision (Allow/Block)</a:t>
             </a:r>
           </a:p>
           <a:p>
             <a:pPr/>
             <a:r>
-              <a:t>4. Obfuscation: Complex encodings (Blocked by Semantic Analysis).</a:t>
-            </a:r>
-          </a:p>
-          <a:p>
-            <a:pPr/>
-            <a:r>
-              <a:t>5. Dashboard: Real-time visualization of these events.</a:t>
+              <a:t>-&gt; Dashboard (WebSocket Stream)</a:t>
             </a:r>
           </a:p>
         </p:txBody>
@@ -3804,7 +3883,7 @@
           <a:lstStyle/>
           <a:p>
             <a:r>
-              <a:t>Conclusion</a:t>
+              <a:t>Live Demo Plan</a:t>
             </a:r>
           </a:p>
         </p:txBody>
@@ -3825,19 +3904,31 @@
           <a:lstStyle/>
           <a:p>
             <a:r>
-              <a:t>EtherX Sentinel represents the future of adaptive application security.</a:t>
+              <a:t>1. Normal Traffic: Browsing the site (Allowed).</a:t>
             </a:r>
           </a:p>
           <a:p>
             <a:pPr/>
             <a:r>
-              <a:t>It learns, evolves, and protects without manual intervention.</a:t>
+              <a:t>2. SQL Injection: Attempting 'OR 1=1' (Blocked by AI).</a:t>
             </a:r>
           </a:p>
           <a:p>
             <a:pPr/>
             <a:r>
-              <a:t>Team KADAVUL is proud to present this next-gen solution.</a:t>
+              <a:t>3. XSS Attack: Trying '&lt;script&gt;' tags (Blocked).</a:t>
+            </a:r>
+          </a:p>
+          <a:p>
+            <a:pPr/>
+            <a:r>
+              <a:t>4. Obfuscation: Complex encodings (Blocked by Semantic Analysis).</a:t>
+            </a:r>
+          </a:p>
+          <a:p>
+            <a:pPr/>
+            <a:r>
+              <a:t>5. Dashboard: Real-time visualization of these events.</a:t>
             </a:r>
           </a:p>
         </p:txBody>

</xml_diff>